<commit_message>
Tried to add to database
</commit_message>
<xml_diff>
--- a/databases/Alex/#tutorial-1/LECTURE_5_intro_to_data_science.pptx
+++ b/databases/Alex/#tutorial-1/LECTURE_5_intro_to_data_science.pptx
@@ -331,9 +331,9 @@
           <a:p>
             <a:fld id="{1D8BD707-D9CF-40AE-B4C6-C98DA3205C09}" type="datetimeFigureOut">
               <a:rPr lang="en-US" smtClean="0"/>
-              <a:t>1/12/2020</a:t>
+              <a:t>2/8/2020</a:t>
             </a:fld>
-            <a:endParaRPr lang="en-US"/>
+            <a:endParaRPr lang="en-US" dirty="0"/>
           </a:p>
         </p:txBody>
       </p:sp>
@@ -361,50 +361,49 @@
               </a:spcBef>
             </a:pPr>
             <a:r>
-              <a:rPr lang="en-US" spc="5"/>
+              <a:rPr lang="en-US" spc="5" dirty="0"/>
               <a:t>© </a:t>
             </a:r>
             <a:r>
-              <a:rPr lang="en-US"/>
+              <a:rPr lang="en-US" dirty="0"/>
               <a:t>Learning </a:t>
             </a:r>
             <a:r>
-              <a:rPr lang="en-US" spc="0"/>
+              <a:rPr lang="en-US" spc="0" dirty="0"/>
               <a:t>Tree </a:t>
             </a:r>
             <a:r>
-              <a:rPr lang="en-US" spc="-5"/>
+              <a:rPr lang="en-US" spc="-5" dirty="0"/>
               <a:t>International, Inc. All </a:t>
             </a:r>
             <a:r>
-              <a:rPr lang="en-US" spc="0"/>
+              <a:rPr lang="en-US" spc="0" dirty="0"/>
               <a:t>rights </a:t>
             </a:r>
             <a:r>
-              <a:rPr lang="en-US"/>
+              <a:rPr lang="en-US" dirty="0"/>
               <a:t>reserved. Not to </a:t>
             </a:r>
             <a:r>
-              <a:rPr lang="en-US" spc="5"/>
+              <a:rPr lang="en-US" spc="5" dirty="0"/>
               <a:t>be </a:t>
             </a:r>
             <a:r>
-              <a:rPr lang="en-US"/>
+              <a:rPr lang="en-US" dirty="0"/>
               <a:t>reproduced without prior </a:t>
             </a:r>
             <a:r>
-              <a:rPr lang="en-US" spc="-5"/>
+              <a:rPr lang="en-US" spc="-5" dirty="0"/>
               <a:t>written</a:t>
             </a:r>
             <a:r>
-              <a:rPr lang="en-US" spc="160"/>
-              <a:t> </a:t>
-            </a:r>
-            <a:r>
-              <a:rPr lang="en-US"/>
+              <a:rPr lang="en-US" spc="160" dirty="0"/>
+              <a:t> </a:t>
+            </a:r>
+            <a:r>
+              <a:rPr lang="en-US" dirty="0"/>
               <a:t>consent.</a:t>
             </a:r>
-            <a:endParaRPr lang="en-US" dirty="0"/>
           </a:p>
         </p:txBody>
       </p:sp>
@@ -434,7 +433,7 @@
               </a:lnSpc>
             </a:pPr>
             <a:r>
-              <a:rPr lang="en-GB" spc="0"/>
+              <a:rPr lang="en-GB" spc="0" dirty="0"/>
               <a:t>1-</a:t>
             </a:r>
             <a:fld id="{81D60167-4931-47E6-BA6A-407CBD079E47}" type="slidenum">
@@ -648,9 +647,9 @@
           <a:p>
             <a:fld id="{1D8BD707-D9CF-40AE-B4C6-C98DA3205C09}" type="datetimeFigureOut">
               <a:rPr lang="en-US" smtClean="0"/>
-              <a:t>1/12/2020</a:t>
+              <a:t>2/8/2020</a:t>
             </a:fld>
-            <a:endParaRPr lang="en-US"/>
+            <a:endParaRPr lang="en-US" dirty="0"/>
           </a:p>
         </p:txBody>
       </p:sp>
@@ -680,7 +679,7 @@
               </a:lnSpc>
             </a:pPr>
             <a:r>
-              <a:rPr lang="en-GB" spc="0"/>
+              <a:rPr lang="en-GB" spc="0" dirty="0"/>
               <a:t>1-</a:t>
             </a:r>
             <a:fld id="{81D60167-4931-47E6-BA6A-407CBD079E47}" type="slidenum">
@@ -957,9 +956,9 @@
           <a:p>
             <a:fld id="{1D8BD707-D9CF-40AE-B4C6-C98DA3205C09}" type="datetimeFigureOut">
               <a:rPr lang="en-US" smtClean="0"/>
-              <a:t>1/12/2020</a:t>
+              <a:t>2/8/2020</a:t>
             </a:fld>
-            <a:endParaRPr lang="en-US"/>
+            <a:endParaRPr lang="en-US" dirty="0"/>
           </a:p>
         </p:txBody>
       </p:sp>
@@ -989,7 +988,7 @@
               </a:lnSpc>
             </a:pPr>
             <a:r>
-              <a:rPr lang="en-GB" spc="0"/>
+              <a:rPr lang="en-GB" spc="0" dirty="0"/>
               <a:t>1-</a:t>
             </a:r>
             <a:fld id="{81D60167-4931-47E6-BA6A-407CBD079E47}" type="slidenum">
@@ -1201,9 +1200,9 @@
           <a:p>
             <a:fld id="{1D8BD707-D9CF-40AE-B4C6-C98DA3205C09}" type="datetimeFigureOut">
               <a:rPr lang="en-US" smtClean="0"/>
-              <a:t>1/12/2020</a:t>
+              <a:t>2/8/2020</a:t>
             </a:fld>
-            <a:endParaRPr lang="en-US"/>
+            <a:endParaRPr lang="en-US" dirty="0"/>
           </a:p>
         </p:txBody>
       </p:sp>
@@ -1233,7 +1232,7 @@
               </a:lnSpc>
             </a:pPr>
             <a:r>
-              <a:rPr lang="en-GB" spc="0"/>
+              <a:rPr lang="en-GB" spc="0" dirty="0"/>
               <a:t>1-</a:t>
             </a:r>
             <a:fld id="{81D60167-4931-47E6-BA6A-407CBD079E47}" type="slidenum">
@@ -1429,9 +1428,9 @@
           <a:p>
             <a:fld id="{1D8BD707-D9CF-40AE-B4C6-C98DA3205C09}" type="datetimeFigureOut">
               <a:rPr lang="en-US" smtClean="0"/>
-              <a:t>1/12/2020</a:t>
+              <a:t>2/8/2020</a:t>
             </a:fld>
-            <a:endParaRPr lang="en-US"/>
+            <a:endParaRPr lang="en-US" dirty="0"/>
           </a:p>
         </p:txBody>
       </p:sp>
@@ -1461,7 +1460,7 @@
               </a:lnSpc>
             </a:pPr>
             <a:r>
-              <a:rPr lang="en-GB" spc="0"/>
+              <a:rPr lang="en-GB" spc="0" dirty="0"/>
               <a:t>1-</a:t>
             </a:r>
             <a:fld id="{81D60167-4931-47E6-BA6A-407CBD079E47}" type="slidenum">
@@ -1733,9 +1732,9 @@
           <a:p>
             <a:fld id="{1D8BD707-D9CF-40AE-B4C6-C98DA3205C09}" type="datetimeFigureOut">
               <a:rPr lang="en-US" smtClean="0"/>
-              <a:t>1/12/2020</a:t>
+              <a:t>2/8/2020</a:t>
             </a:fld>
-            <a:endParaRPr lang="en-US"/>
+            <a:endParaRPr lang="en-US" dirty="0"/>
           </a:p>
         </p:txBody>
       </p:sp>
@@ -1765,7 +1764,7 @@
               </a:lnSpc>
             </a:pPr>
             <a:r>
-              <a:rPr lang="en-GB" spc="0"/>
+              <a:rPr lang="en-GB" spc="0" dirty="0"/>
               <a:t>1-</a:t>
             </a:r>
             <a:fld id="{81D60167-4931-47E6-BA6A-407CBD079E47}" type="slidenum">
@@ -1898,9 +1897,9 @@
           <a:p>
             <a:fld id="{1D8BD707-D9CF-40AE-B4C6-C98DA3205C09}" type="datetimeFigureOut">
               <a:rPr lang="en-US" smtClean="0"/>
-              <a:t>1/12/2020</a:t>
+              <a:t>2/8/2020</a:t>
             </a:fld>
-            <a:endParaRPr lang="en-US"/>
+            <a:endParaRPr lang="en-US" dirty="0"/>
           </a:p>
         </p:txBody>
       </p:sp>
@@ -1925,7 +1924,7 @@
               </a:lnSpc>
             </a:pPr>
             <a:r>
-              <a:rPr lang="en-GB" spc="0"/>
+              <a:rPr lang="en-GB" spc="0" dirty="0"/>
               <a:t>1-</a:t>
             </a:r>
             <a:fld id="{81D60167-4931-47E6-BA6A-407CBD079E47}" type="slidenum">
@@ -2068,9 +2067,9 @@
           <a:p>
             <a:fld id="{1D8BD707-D9CF-40AE-B4C6-C98DA3205C09}" type="datetimeFigureOut">
               <a:rPr lang="en-US" smtClean="0"/>
-              <a:t>1/12/2020</a:t>
+              <a:t>2/8/2020</a:t>
             </a:fld>
-            <a:endParaRPr lang="en-US"/>
+            <a:endParaRPr lang="en-US" dirty="0"/>
           </a:p>
         </p:txBody>
       </p:sp>
@@ -2095,7 +2094,7 @@
               </a:lnSpc>
             </a:pPr>
             <a:r>
-              <a:rPr lang="en-GB" spc="0"/>
+              <a:rPr lang="en-GB" spc="0" dirty="0"/>
               <a:t>1-</a:t>
             </a:r>
             <a:fld id="{81D60167-4931-47E6-BA6A-407CBD079E47}" type="slidenum">
@@ -2238,9 +2237,9 @@
           <a:p>
             <a:fld id="{1D8BD707-D9CF-40AE-B4C6-C98DA3205C09}" type="datetimeFigureOut">
               <a:rPr lang="en-US" smtClean="0"/>
-              <a:t>1/12/2020</a:t>
+              <a:t>2/8/2020</a:t>
             </a:fld>
-            <a:endParaRPr lang="en-US"/>
+            <a:endParaRPr lang="en-US" dirty="0"/>
           </a:p>
         </p:txBody>
       </p:sp>
@@ -2268,50 +2267,49 @@
               </a:spcBef>
             </a:pPr>
             <a:r>
-              <a:rPr lang="en-US" spc="5"/>
+              <a:rPr lang="en-US" spc="5" dirty="0"/>
               <a:t>© </a:t>
             </a:r>
             <a:r>
-              <a:rPr lang="en-US"/>
+              <a:rPr lang="en-US" dirty="0"/>
               <a:t>Learning </a:t>
             </a:r>
             <a:r>
-              <a:rPr lang="en-US" spc="0"/>
+              <a:rPr lang="en-US" spc="0" dirty="0"/>
               <a:t>Tree </a:t>
             </a:r>
             <a:r>
-              <a:rPr lang="en-US" spc="-5"/>
+              <a:rPr lang="en-US" spc="-5" dirty="0"/>
               <a:t>International, Inc. All </a:t>
             </a:r>
             <a:r>
-              <a:rPr lang="en-US" spc="0"/>
+              <a:rPr lang="en-US" spc="0" dirty="0"/>
               <a:t>rights </a:t>
             </a:r>
             <a:r>
-              <a:rPr lang="en-US"/>
+              <a:rPr lang="en-US" dirty="0"/>
               <a:t>reserved. Not to </a:t>
             </a:r>
             <a:r>
-              <a:rPr lang="en-US" spc="5"/>
+              <a:rPr lang="en-US" spc="5" dirty="0"/>
               <a:t>be </a:t>
             </a:r>
             <a:r>
-              <a:rPr lang="en-US"/>
+              <a:rPr lang="en-US" dirty="0"/>
               <a:t>reproduced without prior </a:t>
             </a:r>
             <a:r>
-              <a:rPr lang="en-US" spc="-5"/>
+              <a:rPr lang="en-US" spc="-5" dirty="0"/>
               <a:t>written</a:t>
             </a:r>
             <a:r>
-              <a:rPr lang="en-US" spc="160"/>
-              <a:t> </a:t>
-            </a:r>
-            <a:r>
-              <a:rPr lang="en-US"/>
+              <a:rPr lang="en-US" spc="160" dirty="0"/>
+              <a:t> </a:t>
+            </a:r>
+            <a:r>
+              <a:rPr lang="en-US" dirty="0"/>
               <a:t>consent.</a:t>
             </a:r>
-            <a:endParaRPr lang="en-US" dirty="0"/>
           </a:p>
         </p:txBody>
       </p:sp>
@@ -2336,7 +2334,7 @@
               </a:lnSpc>
             </a:pPr>
             <a:r>
-              <a:rPr lang="en-GB" spc="0"/>
+              <a:rPr lang="en-GB" spc="0" dirty="0"/>
               <a:t>1-</a:t>
             </a:r>
             <a:fld id="{81D60167-4931-47E6-BA6A-407CBD079E47}" type="slidenum">
@@ -2546,9 +2544,9 @@
           <a:p>
             <a:fld id="{1D8BD707-D9CF-40AE-B4C6-C98DA3205C09}" type="datetimeFigureOut">
               <a:rPr lang="en-US" smtClean="0"/>
-              <a:t>1/12/2020</a:t>
+              <a:t>2/8/2020</a:t>
             </a:fld>
-            <a:endParaRPr lang="en-US"/>
+            <a:endParaRPr lang="en-US" dirty="0"/>
           </a:p>
         </p:txBody>
       </p:sp>
@@ -2576,50 +2574,49 @@
               </a:spcBef>
             </a:pPr>
             <a:r>
-              <a:rPr lang="en-US" spc="5"/>
+              <a:rPr lang="en-US" spc="5" dirty="0"/>
               <a:t>© </a:t>
             </a:r>
             <a:r>
-              <a:rPr lang="en-US"/>
+              <a:rPr lang="en-US" dirty="0"/>
               <a:t>Learning </a:t>
             </a:r>
             <a:r>
-              <a:rPr lang="en-US" spc="0"/>
+              <a:rPr lang="en-US" spc="0" dirty="0"/>
               <a:t>Tree </a:t>
             </a:r>
             <a:r>
-              <a:rPr lang="en-US" spc="-5"/>
+              <a:rPr lang="en-US" spc="-5" dirty="0"/>
               <a:t>International, Inc. All </a:t>
             </a:r>
             <a:r>
-              <a:rPr lang="en-US" spc="0"/>
+              <a:rPr lang="en-US" spc="0" dirty="0"/>
               <a:t>rights </a:t>
             </a:r>
             <a:r>
-              <a:rPr lang="en-US"/>
+              <a:rPr lang="en-US" dirty="0"/>
               <a:t>reserved. Not to </a:t>
             </a:r>
             <a:r>
-              <a:rPr lang="en-US" spc="5"/>
+              <a:rPr lang="en-US" spc="5" dirty="0"/>
               <a:t>be </a:t>
             </a:r>
             <a:r>
-              <a:rPr lang="en-US"/>
+              <a:rPr lang="en-US" dirty="0"/>
               <a:t>reproduced without prior </a:t>
             </a:r>
             <a:r>
-              <a:rPr lang="en-US" spc="-5"/>
+              <a:rPr lang="en-US" spc="-5" dirty="0"/>
               <a:t>written</a:t>
             </a:r>
             <a:r>
-              <a:rPr lang="en-US" spc="160"/>
-              <a:t> </a:t>
-            </a:r>
-            <a:r>
-              <a:rPr lang="en-US"/>
+              <a:rPr lang="en-US" spc="160" dirty="0"/>
+              <a:t> </a:t>
+            </a:r>
+            <a:r>
+              <a:rPr lang="en-US" dirty="0"/>
               <a:t>consent.</a:t>
             </a:r>
-            <a:endParaRPr lang="en-US" dirty="0"/>
           </a:p>
         </p:txBody>
       </p:sp>
@@ -2649,7 +2646,7 @@
               </a:lnSpc>
             </a:pPr>
             <a:r>
-              <a:rPr lang="en-GB" spc="0"/>
+              <a:rPr lang="en-GB" spc="0" dirty="0"/>
               <a:t>1-</a:t>
             </a:r>
             <a:fld id="{81D60167-4931-47E6-BA6A-407CBD079E47}" type="slidenum">
@@ -2848,9 +2845,9 @@
           <a:p>
             <a:fld id="{1D8BD707-D9CF-40AE-B4C6-C98DA3205C09}" type="datetimeFigureOut">
               <a:rPr lang="en-US" smtClean="0"/>
-              <a:t>1/12/2020</a:t>
+              <a:t>2/8/2020</a:t>
             </a:fld>
-            <a:endParaRPr lang="en-US"/>
+            <a:endParaRPr lang="en-US" dirty="0"/>
           </a:p>
         </p:txBody>
       </p:sp>
@@ -2878,50 +2875,49 @@
               </a:spcBef>
             </a:pPr>
             <a:r>
-              <a:rPr lang="en-US" spc="5"/>
+              <a:rPr lang="en-US" spc="5" dirty="0"/>
               <a:t>© </a:t>
             </a:r>
             <a:r>
-              <a:rPr lang="en-US"/>
+              <a:rPr lang="en-US" dirty="0"/>
               <a:t>Learning </a:t>
             </a:r>
             <a:r>
-              <a:rPr lang="en-US" spc="0"/>
+              <a:rPr lang="en-US" spc="0" dirty="0"/>
               <a:t>Tree </a:t>
             </a:r>
             <a:r>
-              <a:rPr lang="en-US" spc="-5"/>
+              <a:rPr lang="en-US" spc="-5" dirty="0"/>
               <a:t>International, Inc. All </a:t>
             </a:r>
             <a:r>
-              <a:rPr lang="en-US" spc="0"/>
+              <a:rPr lang="en-US" spc="0" dirty="0"/>
               <a:t>rights </a:t>
             </a:r>
             <a:r>
-              <a:rPr lang="en-US"/>
+              <a:rPr lang="en-US" dirty="0"/>
               <a:t>reserved. Not to </a:t>
             </a:r>
             <a:r>
-              <a:rPr lang="en-US" spc="5"/>
+              <a:rPr lang="en-US" spc="5" dirty="0"/>
               <a:t>be </a:t>
             </a:r>
             <a:r>
-              <a:rPr lang="en-US"/>
+              <a:rPr lang="en-US" dirty="0"/>
               <a:t>reproduced without prior </a:t>
             </a:r>
             <a:r>
-              <a:rPr lang="en-US" spc="-5"/>
+              <a:rPr lang="en-US" spc="-5" dirty="0"/>
               <a:t>written</a:t>
             </a:r>
             <a:r>
-              <a:rPr lang="en-US" spc="160"/>
-              <a:t> </a:t>
-            </a:r>
-            <a:r>
-              <a:rPr lang="en-US"/>
+              <a:rPr lang="en-US" spc="160" dirty="0"/>
+              <a:t> </a:t>
+            </a:r>
+            <a:r>
+              <a:rPr lang="en-US" dirty="0"/>
               <a:t>consent.</a:t>
             </a:r>
-            <a:endParaRPr lang="en-US" dirty="0"/>
           </a:p>
         </p:txBody>
       </p:sp>
@@ -2951,7 +2947,7 @@
               </a:lnSpc>
             </a:pPr>
             <a:r>
-              <a:rPr lang="en-GB" spc="0"/>
+              <a:rPr lang="en-GB" spc="0" dirty="0"/>
               <a:t>1-</a:t>
             </a:r>
             <a:fld id="{81D60167-4931-47E6-BA6A-407CBD079E47}" type="slidenum">
@@ -3284,9 +3280,9 @@
           <a:p>
             <a:fld id="{1D8BD707-D9CF-40AE-B4C6-C98DA3205C09}" type="datetimeFigureOut">
               <a:rPr lang="en-US" smtClean="0"/>
-              <a:t>1/12/2020</a:t>
+              <a:t>2/8/2020</a:t>
             </a:fld>
-            <a:endParaRPr lang="en-US"/>
+            <a:endParaRPr lang="en-US" dirty="0"/>
           </a:p>
         </p:txBody>
       </p:sp>
@@ -3314,50 +3310,49 @@
               </a:spcBef>
             </a:pPr>
             <a:r>
-              <a:rPr lang="en-US" spc="5"/>
+              <a:rPr lang="en-US" spc="5" dirty="0"/>
               <a:t>© </a:t>
             </a:r>
             <a:r>
-              <a:rPr lang="en-US"/>
+              <a:rPr lang="en-US" dirty="0"/>
               <a:t>Learning </a:t>
             </a:r>
             <a:r>
-              <a:rPr lang="en-US" spc="0"/>
+              <a:rPr lang="en-US" spc="0" dirty="0"/>
               <a:t>Tree </a:t>
             </a:r>
             <a:r>
-              <a:rPr lang="en-US" spc="-5"/>
+              <a:rPr lang="en-US" spc="-5" dirty="0"/>
               <a:t>International, Inc. All </a:t>
             </a:r>
             <a:r>
-              <a:rPr lang="en-US" spc="0"/>
+              <a:rPr lang="en-US" spc="0" dirty="0"/>
               <a:t>rights </a:t>
             </a:r>
             <a:r>
-              <a:rPr lang="en-US"/>
+              <a:rPr lang="en-US" dirty="0"/>
               <a:t>reserved. Not to </a:t>
             </a:r>
             <a:r>
-              <a:rPr lang="en-US" spc="5"/>
+              <a:rPr lang="en-US" spc="5" dirty="0"/>
               <a:t>be </a:t>
             </a:r>
             <a:r>
-              <a:rPr lang="en-US"/>
+              <a:rPr lang="en-US" dirty="0"/>
               <a:t>reproduced without prior </a:t>
             </a:r>
             <a:r>
-              <a:rPr lang="en-US" spc="-5"/>
+              <a:rPr lang="en-US" spc="-5" dirty="0"/>
               <a:t>written</a:t>
             </a:r>
             <a:r>
-              <a:rPr lang="en-US" spc="160"/>
-              <a:t> </a:t>
-            </a:r>
-            <a:r>
-              <a:rPr lang="en-US"/>
+              <a:rPr lang="en-US" spc="160" dirty="0"/>
+              <a:t> </a:t>
+            </a:r>
+            <a:r>
+              <a:rPr lang="en-US" dirty="0"/>
               <a:t>consent.</a:t>
             </a:r>
-            <a:endParaRPr lang="en-US" dirty="0"/>
           </a:p>
         </p:txBody>
       </p:sp>
@@ -3387,7 +3382,7 @@
               </a:lnSpc>
             </a:pPr>
             <a:r>
-              <a:rPr lang="en-GB" spc="0"/>
+              <a:rPr lang="en-GB" spc="0" dirty="0"/>
               <a:t>1-</a:t>
             </a:r>
             <a:fld id="{81D60167-4931-47E6-BA6A-407CBD079E47}" type="slidenum">
@@ -3473,9 +3468,9 @@
           <a:p>
             <a:fld id="{1D8BD707-D9CF-40AE-B4C6-C98DA3205C09}" type="datetimeFigureOut">
               <a:rPr lang="en-US" smtClean="0"/>
-              <a:t>1/12/2020</a:t>
+              <a:t>2/8/2020</a:t>
             </a:fld>
-            <a:endParaRPr lang="en-US"/>
+            <a:endParaRPr lang="en-US" dirty="0"/>
           </a:p>
         </p:txBody>
       </p:sp>
@@ -3500,7 +3495,7 @@
               </a:lnSpc>
             </a:pPr>
             <a:r>
-              <a:rPr lang="en-GB" spc="0"/>
+              <a:rPr lang="en-GB" spc="0" dirty="0"/>
               <a:t>1-</a:t>
             </a:r>
             <a:fld id="{81D60167-4931-47E6-BA6A-407CBD079E47}" type="slidenum">
@@ -3558,9 +3553,9 @@
           <a:p>
             <a:fld id="{1D8BD707-D9CF-40AE-B4C6-C98DA3205C09}" type="datetimeFigureOut">
               <a:rPr lang="en-US" smtClean="0"/>
-              <a:t>1/12/2020</a:t>
+              <a:t>2/8/2020</a:t>
             </a:fld>
-            <a:endParaRPr lang="en-US"/>
+            <a:endParaRPr lang="en-US" dirty="0"/>
           </a:p>
         </p:txBody>
       </p:sp>
@@ -3585,7 +3580,7 @@
               </a:lnSpc>
             </a:pPr>
             <a:r>
-              <a:rPr lang="en-GB" spc="0"/>
+              <a:rPr lang="en-GB" spc="0" dirty="0"/>
               <a:t>1-</a:t>
             </a:r>
             <a:fld id="{81D60167-4931-47E6-BA6A-407CBD079E47}" type="slidenum">
@@ -3799,9 +3794,9 @@
           <a:p>
             <a:fld id="{1D8BD707-D9CF-40AE-B4C6-C98DA3205C09}" type="datetimeFigureOut">
               <a:rPr lang="en-US" smtClean="0"/>
-              <a:t>1/12/2020</a:t>
+              <a:t>2/8/2020</a:t>
             </a:fld>
-            <a:endParaRPr lang="en-US"/>
+            <a:endParaRPr lang="en-US" dirty="0"/>
           </a:p>
         </p:txBody>
       </p:sp>
@@ -3826,7 +3821,7 @@
               </a:lnSpc>
             </a:pPr>
             <a:r>
-              <a:rPr lang="en-GB" spc="0"/>
+              <a:rPr lang="en-GB" spc="0" dirty="0"/>
               <a:t>1-</a:t>
             </a:r>
             <a:fld id="{81D60167-4931-47E6-BA6A-407CBD079E47}" type="slidenum">
@@ -3961,10 +3956,9 @@
           </a:lstStyle>
           <a:p>
             <a:r>
-              <a:rPr lang="en-US"/>
+              <a:rPr lang="en-US" dirty="0"/>
               <a:t>Click icon to add picture</a:t>
             </a:r>
-            <a:endParaRPr lang="en-US" dirty="0"/>
           </a:p>
         </p:txBody>
       </p:sp>
@@ -4052,9 +4046,9 @@
           <a:p>
             <a:fld id="{1D8BD707-D9CF-40AE-B4C6-C98DA3205C09}" type="datetimeFigureOut">
               <a:rPr lang="en-US" smtClean="0"/>
-              <a:t>1/12/2020</a:t>
+              <a:t>2/8/2020</a:t>
             </a:fld>
-            <a:endParaRPr lang="en-US"/>
+            <a:endParaRPr lang="en-US" dirty="0"/>
           </a:p>
         </p:txBody>
       </p:sp>
@@ -4084,7 +4078,7 @@
               </a:lnSpc>
             </a:pPr>
             <a:r>
-              <a:rPr lang="en-GB" spc="0"/>
+              <a:rPr lang="en-GB" spc="0" dirty="0"/>
               <a:t>1-</a:t>
             </a:r>
             <a:fld id="{81D60167-4931-47E6-BA6A-407CBD079E47}" type="slidenum">
@@ -6077,9 +6071,9 @@
           <a:p>
             <a:fld id="{1D8BD707-D9CF-40AE-B4C6-C98DA3205C09}" type="datetimeFigureOut">
               <a:rPr lang="en-US" smtClean="0"/>
-              <a:t>1/12/2020</a:t>
+              <a:t>2/8/2020</a:t>
             </a:fld>
-            <a:endParaRPr lang="en-US"/>
+            <a:endParaRPr lang="en-US" dirty="0"/>
           </a:p>
         </p:txBody>
       </p:sp>
@@ -6125,50 +6119,49 @@
               </a:spcBef>
             </a:pPr>
             <a:r>
-              <a:rPr lang="en-US" spc="5"/>
+              <a:rPr lang="en-US" spc="5" dirty="0"/>
               <a:t>© </a:t>
             </a:r>
             <a:r>
-              <a:rPr lang="en-US"/>
+              <a:rPr lang="en-US" dirty="0"/>
               <a:t>Learning </a:t>
             </a:r>
             <a:r>
-              <a:rPr lang="en-US" spc="0"/>
+              <a:rPr lang="en-US" spc="0" dirty="0"/>
               <a:t>Tree </a:t>
             </a:r>
             <a:r>
-              <a:rPr lang="en-US" spc="-5"/>
+              <a:rPr lang="en-US" spc="-5" dirty="0"/>
               <a:t>International, Inc. All </a:t>
             </a:r>
             <a:r>
-              <a:rPr lang="en-US" spc="0"/>
+              <a:rPr lang="en-US" spc="0" dirty="0"/>
               <a:t>rights </a:t>
             </a:r>
             <a:r>
-              <a:rPr lang="en-US"/>
+              <a:rPr lang="en-US" dirty="0"/>
               <a:t>reserved. Not to </a:t>
             </a:r>
             <a:r>
-              <a:rPr lang="en-US" spc="5"/>
+              <a:rPr lang="en-US" spc="5" dirty="0"/>
               <a:t>be </a:t>
             </a:r>
             <a:r>
-              <a:rPr lang="en-US"/>
+              <a:rPr lang="en-US" dirty="0"/>
               <a:t>reproduced without prior </a:t>
             </a:r>
             <a:r>
-              <a:rPr lang="en-US" spc="-5"/>
+              <a:rPr lang="en-US" spc="-5" dirty="0"/>
               <a:t>written</a:t>
             </a:r>
             <a:r>
-              <a:rPr lang="en-US" spc="160"/>
-              <a:t> </a:t>
-            </a:r>
-            <a:r>
-              <a:rPr lang="en-US"/>
+              <a:rPr lang="en-US" spc="160" dirty="0"/>
+              <a:t> </a:t>
+            </a:r>
+            <a:r>
+              <a:rPr lang="en-US" dirty="0"/>
               <a:t>consent.</a:t>
             </a:r>
-            <a:endParaRPr lang="en-US" dirty="0"/>
           </a:p>
         </p:txBody>
       </p:sp>
@@ -6209,7 +6202,7 @@
               </a:lnSpc>
             </a:pPr>
             <a:r>
-              <a:rPr lang="en-GB" spc="0"/>
+              <a:rPr lang="en-GB" spc="0" dirty="0"/>
               <a:t>1-</a:t>
             </a:r>
             <a:fld id="{81D60167-4931-47E6-BA6A-407CBD079E47}" type="slidenum">
@@ -8570,7 +8563,7 @@
           </a:lstStyle>
           <a:p>
             <a:r>
-              <a:rPr lang="en-US">
+              <a:rPr lang="en-US" dirty="0">
                 <a:solidFill>
                   <a:srgbClr val="222222"/>
                 </a:solidFill>
@@ -8579,7 +8572,7 @@
               <a:t>Clustering </a:t>
             </a:r>
             <a:br>
-              <a:rPr lang="en-US">
+              <a:rPr lang="en-US" dirty="0">
                 <a:solidFill>
                   <a:srgbClr val="222222"/>
                 </a:solidFill>
@@ -10802,7 +10795,7 @@
           <a:bodyPr wrap="square" lIns="0" tIns="0" rIns="0" bIns="0" rtlCol="0"/>
           <a:lstStyle/>
           <a:p>
-            <a:endParaRPr/>
+            <a:endParaRPr dirty="0"/>
           </a:p>
         </p:txBody>
       </p:sp>
@@ -10844,7 +10837,7 @@
           <a:bodyPr wrap="square" lIns="0" tIns="0" rIns="0" bIns="0" rtlCol="0"/>
           <a:lstStyle/>
           <a:p>
-            <a:endParaRPr/>
+            <a:endParaRPr dirty="0"/>
           </a:p>
         </p:txBody>
       </p:sp>
@@ -10886,7 +10879,7 @@
           <a:bodyPr wrap="square" lIns="0" tIns="0" rIns="0" bIns="0" rtlCol="0"/>
           <a:lstStyle/>
           <a:p>
-            <a:endParaRPr/>
+            <a:endParaRPr dirty="0"/>
           </a:p>
         </p:txBody>
       </p:sp>
@@ -12125,7 +12118,7 @@
           <a:bodyPr wrap="square" lIns="0" tIns="0" rIns="0" bIns="0" rtlCol="0"/>
           <a:lstStyle/>
           <a:p>
-            <a:endParaRPr/>
+            <a:endParaRPr dirty="0"/>
           </a:p>
         </p:txBody>
       </p:sp>
@@ -12154,7 +12147,7 @@
           <a:bodyPr wrap="square" lIns="0" tIns="0" rIns="0" bIns="0" rtlCol="0"/>
           <a:lstStyle/>
           <a:p>
-            <a:endParaRPr/>
+            <a:endParaRPr dirty="0"/>
           </a:p>
         </p:txBody>
       </p:sp>
@@ -12183,7 +12176,7 @@
           <a:bodyPr wrap="square" lIns="0" tIns="0" rIns="0" bIns="0" rtlCol="0"/>
           <a:lstStyle/>
           <a:p>
-            <a:endParaRPr/>
+            <a:endParaRPr dirty="0"/>
           </a:p>
         </p:txBody>
       </p:sp>
@@ -12212,7 +12205,7 @@
           <a:bodyPr wrap="square" lIns="0" tIns="0" rIns="0" bIns="0" rtlCol="0"/>
           <a:lstStyle/>
           <a:p>
-            <a:endParaRPr/>
+            <a:endParaRPr dirty="0"/>
           </a:p>
         </p:txBody>
       </p:sp>
@@ -12241,7 +12234,7 @@
           <a:bodyPr wrap="square" lIns="0" tIns="0" rIns="0" bIns="0" rtlCol="0"/>
           <a:lstStyle/>
           <a:p>
-            <a:endParaRPr/>
+            <a:endParaRPr dirty="0"/>
           </a:p>
         </p:txBody>
       </p:sp>
@@ -15810,7 +15803,7 @@
               </a:rPr>
               <a:t>language</a:t>
             </a:r>
-            <a:endParaRPr sz="1250">
+            <a:endParaRPr sz="1250" dirty="0">
               <a:latin typeface="Arial"/>
               <a:cs typeface="Arial"/>
             </a:endParaRPr>
@@ -15901,7 +15894,7 @@
               </a:rPr>
               <a:t>Sourcing</a:t>
             </a:r>
-            <a:endParaRPr sz="2150">
+            <a:endParaRPr sz="2150" dirty="0">
               <a:latin typeface="Arial"/>
               <a:cs typeface="Arial"/>
             </a:endParaRPr>
@@ -16067,7 +16060,7 @@
               </a:rPr>
               <a:t>etc.</a:t>
             </a:r>
-            <a:endParaRPr sz="1600">
+            <a:endParaRPr sz="1600" dirty="0">
               <a:latin typeface="Arial"/>
               <a:cs typeface="Arial"/>
             </a:endParaRPr>
@@ -16099,7 +16092,7 @@
           <a:bodyPr wrap="square" lIns="0" tIns="0" rIns="0" bIns="0" rtlCol="0"/>
           <a:lstStyle/>
           <a:p>
-            <a:endParaRPr/>
+            <a:endParaRPr dirty="0"/>
           </a:p>
         </p:txBody>
       </p:sp>
@@ -16128,7 +16121,7 @@
           <a:bodyPr wrap="square" lIns="0" tIns="0" rIns="0" bIns="0" rtlCol="0"/>
           <a:lstStyle/>
           <a:p>
-            <a:endParaRPr/>
+            <a:endParaRPr dirty="0"/>
           </a:p>
         </p:txBody>
       </p:sp>
@@ -16328,7 +16321,7 @@
           <a:bodyPr wrap="square" lIns="0" tIns="0" rIns="0" bIns="0" rtlCol="0"/>
           <a:lstStyle/>
           <a:p>
-            <a:endParaRPr/>
+            <a:endParaRPr dirty="0"/>
           </a:p>
         </p:txBody>
       </p:sp>
@@ -16608,25 +16601,11 @@
               <a:t> </a:t>
             </a:r>
             <a:r>
-              <a:rPr sz="1600" spc="5" dirty="0" err="1">
-                <a:latin typeface="Arial"/>
-                <a:cs typeface="Arial"/>
-              </a:rPr>
-              <a:t>discov</a:t>
-            </a:r>
-            <a:r>
-              <a:rPr lang="en-GB" sz="1600" spc="5" dirty="0" err="1">
-                <a:latin typeface="Arial"/>
-                <a:cs typeface="Arial"/>
-              </a:rPr>
-              <a:t>ering</a:t>
-            </a:r>
-            <a:r>
               <a:rPr lang="en-GB" sz="1600" spc="5" dirty="0">
                 <a:latin typeface="Arial"/>
                 <a:cs typeface="Arial"/>
               </a:rPr>
-              <a:t> patterns and trends</a:t>
+              <a:t>discovering patterns and trends</a:t>
             </a:r>
             <a:r>
               <a:rPr sz="1600" spc="-90" dirty="0">
@@ -16687,6 +16666,13 @@
               <a:t>The</a:t>
             </a:r>
             <a:r>
+              <a:rPr lang="en-GB" sz="1600" spc="25" dirty="0">
+                <a:latin typeface="Arial"/>
+                <a:cs typeface="Arial"/>
+              </a:rPr>
+              <a:t> </a:t>
+            </a:r>
+            <a:r>
               <a:rPr sz="1600" spc="-330" dirty="0">
                 <a:latin typeface="Arial"/>
                 <a:cs typeface="Arial"/>
@@ -17348,7 +17334,14 @@
               </a:tabLst>
             </a:pPr>
             <a:r>
-              <a:rPr sz="1600" spc="10" dirty="0" err="1">
+              <a:rPr lang="en-GB" sz="1600" spc="10" dirty="0">
+                <a:latin typeface="Arial"/>
+                <a:cs typeface="Arial"/>
+              </a:rPr>
+              <a:t>D</a:t>
+            </a:r>
+            <a:r>
+              <a:rPr sz="1600" spc="10" dirty="0">
                 <a:latin typeface="Arial"/>
                 <a:cs typeface="Arial"/>
               </a:rPr>
@@ -17893,7 +17886,7 @@
           <a:bodyPr wrap="square" lIns="0" tIns="0" rIns="0" bIns="0" rtlCol="0"/>
           <a:lstStyle/>
           <a:p>
-            <a:endParaRPr/>
+            <a:endParaRPr dirty="0"/>
           </a:p>
         </p:txBody>
       </p:sp>
@@ -18393,7 +18386,7 @@
           <a:bodyPr wrap="square" lIns="0" tIns="0" rIns="0" bIns="0" rtlCol="0"/>
           <a:lstStyle/>
           <a:p>
-            <a:endParaRPr/>
+            <a:endParaRPr dirty="0"/>
           </a:p>
         </p:txBody>
       </p:sp>
@@ -18605,7 +18598,7 @@
           <a:bodyPr wrap="square" lIns="0" tIns="0" rIns="0" bIns="0" rtlCol="0"/>
           <a:lstStyle/>
           <a:p>
-            <a:endParaRPr/>
+            <a:endParaRPr dirty="0"/>
           </a:p>
         </p:txBody>
       </p:sp>
@@ -18782,7 +18775,7 @@
           <a:bodyPr wrap="square" lIns="0" tIns="0" rIns="0" bIns="0" rtlCol="0"/>
           <a:lstStyle/>
           <a:p>
-            <a:endParaRPr/>
+            <a:endParaRPr dirty="0"/>
           </a:p>
         </p:txBody>
       </p:sp>
@@ -18811,7 +18804,7 @@
           <a:bodyPr wrap="square" lIns="0" tIns="0" rIns="0" bIns="0" rtlCol="0"/>
           <a:lstStyle/>
           <a:p>
-            <a:endParaRPr/>
+            <a:endParaRPr dirty="0"/>
           </a:p>
         </p:txBody>
       </p:sp>
@@ -19011,7 +19004,7 @@
           <a:bodyPr wrap="square" lIns="0" tIns="0" rIns="0" bIns="0" rtlCol="0"/>
           <a:lstStyle/>
           <a:p>
-            <a:endParaRPr/>
+            <a:endParaRPr dirty="0"/>
           </a:p>
         </p:txBody>
       </p:sp>
@@ -19084,7 +19077,7 @@
               </a:rPr>
               <a:t>h</a:t>
             </a:r>
-            <a:endParaRPr sz="1400">
+            <a:endParaRPr sz="1400" dirty="0">
               <a:latin typeface="Bradley Hand ITC"/>
               <a:cs typeface="Bradley Hand ITC"/>
             </a:endParaRPr>
@@ -19287,7 +19280,7 @@
           <a:bodyPr wrap="square" lIns="0" tIns="0" rIns="0" bIns="0" rtlCol="0"/>
           <a:lstStyle/>
           <a:p>
-            <a:endParaRPr/>
+            <a:endParaRPr dirty="0"/>
           </a:p>
         </p:txBody>
       </p:sp>
@@ -19511,7 +19504,7 @@
           <a:bodyPr wrap="square" lIns="0" tIns="0" rIns="0" bIns="0" rtlCol="0"/>
           <a:lstStyle/>
           <a:p>
-            <a:endParaRPr/>
+            <a:endParaRPr dirty="0"/>
           </a:p>
         </p:txBody>
       </p:sp>
@@ -19741,7 +19734,7 @@
           <a:bodyPr wrap="square" lIns="0" tIns="0" rIns="0" bIns="0" rtlCol="0"/>
           <a:lstStyle/>
           <a:p>
-            <a:endParaRPr/>
+            <a:endParaRPr dirty="0"/>
           </a:p>
         </p:txBody>
       </p:sp>
@@ -19968,7 +19961,7 @@
           <a:bodyPr wrap="square" lIns="0" tIns="0" rIns="0" bIns="0" rtlCol="0"/>
           <a:lstStyle/>
           <a:p>
-            <a:endParaRPr/>
+            <a:endParaRPr dirty="0"/>
           </a:p>
         </p:txBody>
       </p:sp>
@@ -20237,7 +20230,7 @@
           <a:bodyPr wrap="square" lIns="0" tIns="0" rIns="0" bIns="0" rtlCol="0"/>
           <a:lstStyle/>
           <a:p>
-            <a:endParaRPr/>
+            <a:endParaRPr dirty="0"/>
           </a:p>
         </p:txBody>
       </p:sp>
@@ -20458,7 +20451,7 @@
           <a:bodyPr wrap="square" lIns="0" tIns="0" rIns="0" bIns="0" rtlCol="0"/>
           <a:lstStyle/>
           <a:p>
-            <a:endParaRPr/>
+            <a:endParaRPr dirty="0"/>
           </a:p>
         </p:txBody>
       </p:sp>
@@ -20673,7 +20666,7 @@
           <a:bodyPr wrap="square" lIns="0" tIns="0" rIns="0" bIns="0" rtlCol="0"/>
           <a:lstStyle/>
           <a:p>
-            <a:endParaRPr/>
+            <a:endParaRPr dirty="0"/>
           </a:p>
         </p:txBody>
       </p:sp>
@@ -20852,7 +20845,7 @@
           <a:bodyPr wrap="square" lIns="0" tIns="0" rIns="0" bIns="0" rtlCol="0"/>
           <a:lstStyle/>
           <a:p>
-            <a:endParaRPr/>
+            <a:endParaRPr dirty="0"/>
           </a:p>
         </p:txBody>
       </p:sp>
@@ -21085,7 +21078,7 @@
           <a:bodyPr wrap="square" lIns="0" tIns="0" rIns="0" bIns="0" rtlCol="0"/>
           <a:lstStyle/>
           <a:p>
-            <a:endParaRPr/>
+            <a:endParaRPr dirty="0"/>
           </a:p>
         </p:txBody>
       </p:sp>
@@ -21158,7 +21151,7 @@
               </a:rPr>
               <a:t>Services</a:t>
             </a:r>
-            <a:endParaRPr sz="1400">
+            <a:endParaRPr sz="1400" dirty="0">
               <a:latin typeface="Bradley Hand ITC"/>
               <a:cs typeface="Bradley Hand ITC"/>
             </a:endParaRPr>
@@ -21182,7 +21175,7 @@
               </a:rPr>
               <a:t>+</a:t>
             </a:r>
-            <a:endParaRPr sz="1250">
+            <a:endParaRPr sz="1250" dirty="0">
               <a:latin typeface="Arial"/>
               <a:cs typeface="Arial"/>
             </a:endParaRPr>
@@ -21228,7 +21221,7 @@
               </a:rPr>
               <a:t>+</a:t>
             </a:r>
-            <a:endParaRPr sz="1250">
+            <a:endParaRPr sz="1250" dirty="0">
               <a:latin typeface="Arial"/>
               <a:cs typeface="Arial"/>
             </a:endParaRPr>
@@ -21545,7 +21538,7 @@
           <a:bodyPr wrap="square" lIns="0" tIns="0" rIns="0" bIns="0" rtlCol="0"/>
           <a:lstStyle/>
           <a:p>
-            <a:endParaRPr/>
+            <a:endParaRPr dirty="0"/>
           </a:p>
         </p:txBody>
       </p:sp>
@@ -21777,7 +21770,7 @@
               </a:rPr>
               <a:t>+</a:t>
             </a:r>
-            <a:endParaRPr sz="1250">
+            <a:endParaRPr sz="1250" dirty="0">
               <a:latin typeface="Arial"/>
               <a:cs typeface="Arial"/>
             </a:endParaRPr>
@@ -21823,7 +21816,7 @@
               </a:rPr>
               <a:t>+</a:t>
             </a:r>
-            <a:endParaRPr sz="1250">
+            <a:endParaRPr sz="1250" dirty="0">
               <a:latin typeface="Arial"/>
               <a:cs typeface="Arial"/>
             </a:endParaRPr>
@@ -21869,7 +21862,7 @@
               </a:rPr>
               <a:t>Resources</a:t>
             </a:r>
-            <a:endParaRPr sz="1400">
+            <a:endParaRPr sz="1400" dirty="0">
               <a:latin typeface="Bradley Hand ITC"/>
               <a:cs typeface="Bradley Hand ITC"/>
             </a:endParaRPr>
@@ -21893,7 +21886,7 @@
               </a:rPr>
               <a:t>+</a:t>
             </a:r>
-            <a:endParaRPr sz="1250">
+            <a:endParaRPr sz="1250" dirty="0">
               <a:latin typeface="Arial"/>
               <a:cs typeface="Arial"/>
             </a:endParaRPr>
@@ -21939,7 +21932,7 @@
               </a:rPr>
               <a:t>Capabilities</a:t>
             </a:r>
-            <a:endParaRPr sz="1400">
+            <a:endParaRPr sz="1400" dirty="0">
               <a:latin typeface="Bradley Hand ITC"/>
               <a:cs typeface="Bradley Hand ITC"/>
             </a:endParaRPr>
@@ -21963,7 +21956,7 @@
               </a:rPr>
               <a:t>+</a:t>
             </a:r>
-            <a:endParaRPr sz="1250">
+            <a:endParaRPr sz="1250" dirty="0">
               <a:latin typeface="Arial"/>
               <a:cs typeface="Arial"/>
             </a:endParaRPr>
@@ -22009,7 +22002,7 @@
               </a:rPr>
               <a:t>+</a:t>
             </a:r>
-            <a:endParaRPr sz="1250">
+            <a:endParaRPr sz="1250" dirty="0">
               <a:latin typeface="Arial"/>
               <a:cs typeface="Arial"/>
             </a:endParaRPr>
@@ -22055,7 +22048,7 @@
               </a:rPr>
               <a:t>+</a:t>
             </a:r>
-            <a:endParaRPr sz="1250">
+            <a:endParaRPr sz="1250" dirty="0">
               <a:latin typeface="Arial"/>
               <a:cs typeface="Arial"/>
             </a:endParaRPr>
@@ -22079,7 +22072,7 @@
               </a:rPr>
               <a:t>Revenue</a:t>
             </a:r>
-            <a:endParaRPr sz="1400">
+            <a:endParaRPr sz="1400" dirty="0">
               <a:latin typeface="Bradley Hand ITC"/>
               <a:cs typeface="Bradley Hand ITC"/>
             </a:endParaRPr>
@@ -22125,7 +22118,7 @@
               </a:rPr>
               <a:t>+</a:t>
             </a:r>
-            <a:endParaRPr sz="1250">
+            <a:endParaRPr sz="1250" dirty="0">
               <a:latin typeface="Arial"/>
               <a:cs typeface="Arial"/>
             </a:endParaRPr>
@@ -22146,7 +22139,7 @@
               </a:rPr>
               <a:t>Sales</a:t>
             </a:r>
-            <a:endParaRPr sz="1400">
+            <a:endParaRPr sz="1400" dirty="0">
               <a:latin typeface="Bradley Hand ITC"/>
               <a:cs typeface="Bradley Hand ITC"/>
             </a:endParaRPr>
@@ -26085,7 +26078,7 @@
           <a:bodyPr wrap="square" lIns="0" tIns="0" rIns="0" bIns="0" rtlCol="0"/>
           <a:lstStyle/>
           <a:p>
-            <a:endParaRPr/>
+            <a:endParaRPr dirty="0"/>
           </a:p>
         </p:txBody>
       </p:sp>
@@ -26285,7 +26278,7 @@
           <a:bodyPr wrap="square" lIns="0" tIns="0" rIns="0" bIns="0" rtlCol="0"/>
           <a:lstStyle/>
           <a:p>
-            <a:endParaRPr/>
+            <a:endParaRPr dirty="0"/>
           </a:p>
         </p:txBody>
       </p:sp>
@@ -26754,7 +26747,7 @@
           <a:bodyPr wrap="square" lIns="0" tIns="0" rIns="0" bIns="0" rtlCol="0"/>
           <a:lstStyle/>
           <a:p>
-            <a:endParaRPr/>
+            <a:endParaRPr dirty="0"/>
           </a:p>
         </p:txBody>
       </p:sp>
@@ -27187,7 +27180,7 @@
               </a:rPr>
               <a:t>h</a:t>
             </a:r>
-            <a:endParaRPr sz="1400">
+            <a:endParaRPr sz="1400" dirty="0">
               <a:latin typeface="Bradley Hand ITC"/>
               <a:cs typeface="Bradley Hand ITC"/>
             </a:endParaRPr>
@@ -27399,7 +27392,7 @@
           <a:bodyPr wrap="square" lIns="0" tIns="0" rIns="0" bIns="0" rtlCol="0"/>
           <a:lstStyle/>
           <a:p>
-            <a:endParaRPr/>
+            <a:endParaRPr dirty="0"/>
           </a:p>
         </p:txBody>
       </p:sp>
@@ -27641,7 +27634,7 @@
           <a:bodyPr wrap="square" lIns="0" tIns="0" rIns="0" bIns="0" rtlCol="0"/>
           <a:lstStyle/>
           <a:p>
-            <a:endParaRPr/>
+            <a:endParaRPr dirty="0"/>
           </a:p>
         </p:txBody>
       </p:sp>
@@ -27856,7 +27849,7 @@
           <a:bodyPr wrap="square" lIns="0" tIns="0" rIns="0" bIns="0" rtlCol="0"/>
           <a:lstStyle/>
           <a:p>
-            <a:endParaRPr/>
+            <a:endParaRPr dirty="0"/>
           </a:p>
         </p:txBody>
       </p:sp>
@@ -28080,7 +28073,7 @@
           <a:bodyPr wrap="square" lIns="0" tIns="0" rIns="0" bIns="0" rtlCol="0"/>
           <a:lstStyle/>
           <a:p>
-            <a:endParaRPr/>
+            <a:endParaRPr dirty="0"/>
           </a:p>
         </p:txBody>
       </p:sp>
@@ -28349,7 +28342,7 @@
           <a:bodyPr wrap="square" lIns="0" tIns="0" rIns="0" bIns="0" rtlCol="0"/>
           <a:lstStyle/>
           <a:p>
-            <a:endParaRPr/>
+            <a:endParaRPr dirty="0"/>
           </a:p>
         </p:txBody>
       </p:sp>
@@ -28576,7 +28569,7 @@
           <a:bodyPr wrap="square" lIns="0" tIns="0" rIns="0" bIns="0" rtlCol="0"/>
           <a:lstStyle/>
           <a:p>
-            <a:endParaRPr/>
+            <a:endParaRPr dirty="0"/>
           </a:p>
         </p:txBody>
       </p:sp>
@@ -28785,7 +28778,7 @@
           <a:bodyPr wrap="square" lIns="0" tIns="0" rIns="0" bIns="0" rtlCol="0"/>
           <a:lstStyle/>
           <a:p>
-            <a:endParaRPr/>
+            <a:endParaRPr dirty="0"/>
           </a:p>
         </p:txBody>
       </p:sp>
@@ -28967,7 +28960,7 @@
           <a:bodyPr wrap="square" lIns="0" tIns="0" rIns="0" bIns="0" rtlCol="0"/>
           <a:lstStyle/>
           <a:p>
-            <a:endParaRPr/>
+            <a:endParaRPr dirty="0"/>
           </a:p>
         </p:txBody>
       </p:sp>
@@ -29194,7 +29187,7 @@
           <a:bodyPr wrap="square" lIns="0" tIns="0" rIns="0" bIns="0" rtlCol="0"/>
           <a:lstStyle/>
           <a:p>
-            <a:endParaRPr/>
+            <a:endParaRPr dirty="0"/>
           </a:p>
         </p:txBody>
       </p:sp>
@@ -29237,7 +29230,7 @@
               </a:rPr>
               <a:t>+</a:t>
             </a:r>
-            <a:endParaRPr sz="1250">
+            <a:endParaRPr sz="1250" dirty="0">
               <a:latin typeface="Arial"/>
               <a:cs typeface="Arial"/>
             </a:endParaRPr>
@@ -29539,7 +29532,7 @@
           <a:bodyPr wrap="square" lIns="0" tIns="0" rIns="0" bIns="0" rtlCol="0"/>
           <a:lstStyle/>
           <a:p>
-            <a:endParaRPr/>
+            <a:endParaRPr dirty="0"/>
           </a:p>
         </p:txBody>
       </p:sp>
@@ -29595,7 +29588,7 @@
               </a:rPr>
               <a:t>+</a:t>
             </a:r>
-            <a:endParaRPr sz="1875" baseline="2222">
+            <a:endParaRPr sz="1875" baseline="2222" dirty="0">
               <a:latin typeface="Arial"/>
               <a:cs typeface="Arial"/>
             </a:endParaRPr>
@@ -29609,7 +29602,7 @@
                 <a:spcPts val="40"/>
               </a:spcBef>
             </a:pPr>
-            <a:endParaRPr sz="1200">
+            <a:endParaRPr sz="1200" dirty="0">
               <a:latin typeface="Times New Roman"/>
               <a:cs typeface="Times New Roman"/>
             </a:endParaRPr>
@@ -29663,7 +29656,7 @@
               </a:rPr>
               <a:t>Services</a:t>
             </a:r>
-            <a:endParaRPr sz="1400">
+            <a:endParaRPr sz="1400" dirty="0">
               <a:latin typeface="Bradley Hand ITC"/>
               <a:cs typeface="Bradley Hand ITC"/>
             </a:endParaRPr>
@@ -29687,7 +29680,7 @@
               </a:rPr>
               <a:t>+</a:t>
             </a:r>
-            <a:endParaRPr sz="1250">
+            <a:endParaRPr sz="1250" dirty="0">
               <a:latin typeface="Arial"/>
               <a:cs typeface="Arial"/>
             </a:endParaRPr>
@@ -29733,7 +29726,7 @@
               </a:rPr>
               <a:t>+</a:t>
             </a:r>
-            <a:endParaRPr sz="1250">
+            <a:endParaRPr sz="1250" dirty="0">
               <a:latin typeface="Arial"/>
               <a:cs typeface="Arial"/>
             </a:endParaRPr>
@@ -29779,7 +29772,7 @@
               </a:rPr>
               <a:t>+</a:t>
             </a:r>
-            <a:endParaRPr sz="1250">
+            <a:endParaRPr sz="1250" dirty="0">
               <a:latin typeface="Arial"/>
               <a:cs typeface="Arial"/>
             </a:endParaRPr>
@@ -29825,7 +29818,7 @@
               </a:rPr>
               <a:t>Resources</a:t>
             </a:r>
-            <a:endParaRPr sz="1400">
+            <a:endParaRPr sz="1400" dirty="0">
               <a:latin typeface="Bradley Hand ITC"/>
               <a:cs typeface="Bradley Hand ITC"/>
             </a:endParaRPr>
@@ -29849,7 +29842,7 @@
               </a:rPr>
               <a:t>+</a:t>
             </a:r>
-            <a:endParaRPr sz="1250">
+            <a:endParaRPr sz="1250" dirty="0">
               <a:latin typeface="Arial"/>
               <a:cs typeface="Arial"/>
             </a:endParaRPr>
@@ -29895,7 +29888,7 @@
               </a:rPr>
               <a:t>Capabilities</a:t>
             </a:r>
-            <a:endParaRPr sz="1400">
+            <a:endParaRPr sz="1400" dirty="0">
               <a:latin typeface="Bradley Hand ITC"/>
               <a:cs typeface="Bradley Hand ITC"/>
             </a:endParaRPr>
@@ -29919,7 +29912,7 @@
               </a:rPr>
               <a:t>+</a:t>
             </a:r>
-            <a:endParaRPr sz="1250">
+            <a:endParaRPr sz="1250" dirty="0">
               <a:latin typeface="Arial"/>
               <a:cs typeface="Arial"/>
             </a:endParaRPr>
@@ -29965,7 +29958,7 @@
               </a:rPr>
               <a:t>+</a:t>
             </a:r>
-            <a:endParaRPr sz="1250">
+            <a:endParaRPr sz="1250" dirty="0">
               <a:latin typeface="Arial"/>
               <a:cs typeface="Arial"/>
             </a:endParaRPr>
@@ -30011,7 +30004,7 @@
               </a:rPr>
               <a:t>+</a:t>
             </a:r>
-            <a:endParaRPr sz="1250">
+            <a:endParaRPr sz="1250" dirty="0">
               <a:latin typeface="Arial"/>
               <a:cs typeface="Arial"/>
             </a:endParaRPr>
@@ -30035,7 +30028,7 @@
               </a:rPr>
               <a:t>Revenue</a:t>
             </a:r>
-            <a:endParaRPr sz="1400">
+            <a:endParaRPr sz="1400" dirty="0">
               <a:latin typeface="Bradley Hand ITC"/>
               <a:cs typeface="Bradley Hand ITC"/>
             </a:endParaRPr>
@@ -30081,7 +30074,7 @@
               </a:rPr>
               <a:t>+</a:t>
             </a:r>
-            <a:endParaRPr sz="1250">
+            <a:endParaRPr sz="1250" dirty="0">
               <a:latin typeface="Arial"/>
               <a:cs typeface="Arial"/>
             </a:endParaRPr>
@@ -30102,7 +30095,7 @@
               </a:rPr>
               <a:t>Sales</a:t>
             </a:r>
-            <a:endParaRPr sz="1400">
+            <a:endParaRPr sz="1400" dirty="0">
               <a:latin typeface="Bradley Hand ITC"/>
               <a:cs typeface="Bradley Hand ITC"/>
             </a:endParaRPr>

</xml_diff>